<commit_message>
update HOG and SIFT
</commit_message>
<xml_diff>
--- a/clases/Cap02_Extraccion_de_Caracteristicas/presentations/PAT02_HoG_HumanDetection.pptx
+++ b/clases/Cap02_Extraccion_de_Caracteristicas/presentations/PAT02_HoG_HumanDetection.pptx
@@ -229,7 +229,7 @@
           <a:p>
             <a:fld id="{FA3AA01D-6B85-5A4E-BAEE-62A41445B4EE}" type="datetimeFigureOut">
               <a:rPr lang="en-US" smtClean="0"/>
-              <a:t>3/7/19</a:t>
+              <a:t>5/23/19</a:t>
             </a:fld>
             <a:endParaRPr lang="en-US"/>
           </a:p>
@@ -771,7 +771,7 @@
           <a:p>
             <a:fld id="{4FDCCE24-03B9-DF4D-B92C-1C16EC88C120}" type="datetimeFigureOut">
               <a:rPr lang="en-US" smtClean="0"/>
-              <a:t>3/7/19</a:t>
+              <a:t>5/23/19</a:t>
             </a:fld>
             <a:endParaRPr lang="en-US"/>
           </a:p>
@@ -941,7 +941,7 @@
           <a:p>
             <a:fld id="{4FDCCE24-03B9-DF4D-B92C-1C16EC88C120}" type="datetimeFigureOut">
               <a:rPr lang="en-US" smtClean="0"/>
-              <a:t>3/7/19</a:t>
+              <a:t>5/23/19</a:t>
             </a:fld>
             <a:endParaRPr lang="en-US"/>
           </a:p>
@@ -1121,7 +1121,7 @@
           <a:p>
             <a:fld id="{4FDCCE24-03B9-DF4D-B92C-1C16EC88C120}" type="datetimeFigureOut">
               <a:rPr lang="en-US" smtClean="0"/>
-              <a:t>3/7/19</a:t>
+              <a:t>5/23/19</a:t>
             </a:fld>
             <a:endParaRPr lang="en-US"/>
           </a:p>
@@ -1291,7 +1291,7 @@
           <a:p>
             <a:fld id="{4FDCCE24-03B9-DF4D-B92C-1C16EC88C120}" type="datetimeFigureOut">
               <a:rPr lang="en-US" smtClean="0"/>
-              <a:t>3/7/19</a:t>
+              <a:t>5/23/19</a:t>
             </a:fld>
             <a:endParaRPr lang="en-US"/>
           </a:p>
@@ -1537,7 +1537,7 @@
           <a:p>
             <a:fld id="{4FDCCE24-03B9-DF4D-B92C-1C16EC88C120}" type="datetimeFigureOut">
               <a:rPr lang="en-US" smtClean="0"/>
-              <a:t>3/7/19</a:t>
+              <a:t>5/23/19</a:t>
             </a:fld>
             <a:endParaRPr lang="en-US"/>
           </a:p>
@@ -1825,7 +1825,7 @@
           <a:p>
             <a:fld id="{4FDCCE24-03B9-DF4D-B92C-1C16EC88C120}" type="datetimeFigureOut">
               <a:rPr lang="en-US" smtClean="0"/>
-              <a:t>3/7/19</a:t>
+              <a:t>5/23/19</a:t>
             </a:fld>
             <a:endParaRPr lang="en-US"/>
           </a:p>
@@ -2247,7 +2247,7 @@
           <a:p>
             <a:fld id="{4FDCCE24-03B9-DF4D-B92C-1C16EC88C120}" type="datetimeFigureOut">
               <a:rPr lang="en-US" smtClean="0"/>
-              <a:t>3/7/19</a:t>
+              <a:t>5/23/19</a:t>
             </a:fld>
             <a:endParaRPr lang="en-US"/>
           </a:p>
@@ -2365,7 +2365,7 @@
           <a:p>
             <a:fld id="{4FDCCE24-03B9-DF4D-B92C-1C16EC88C120}" type="datetimeFigureOut">
               <a:rPr lang="en-US" smtClean="0"/>
-              <a:t>3/7/19</a:t>
+              <a:t>5/23/19</a:t>
             </a:fld>
             <a:endParaRPr lang="en-US"/>
           </a:p>
@@ -2460,7 +2460,7 @@
           <a:p>
             <a:fld id="{4FDCCE24-03B9-DF4D-B92C-1C16EC88C120}" type="datetimeFigureOut">
               <a:rPr lang="en-US" smtClean="0"/>
-              <a:t>3/7/19</a:t>
+              <a:t>5/23/19</a:t>
             </a:fld>
             <a:endParaRPr lang="en-US"/>
           </a:p>
@@ -2737,7 +2737,7 @@
           <a:p>
             <a:fld id="{4FDCCE24-03B9-DF4D-B92C-1C16EC88C120}" type="datetimeFigureOut">
               <a:rPr lang="en-US" smtClean="0"/>
-              <a:t>3/7/19</a:t>
+              <a:t>5/23/19</a:t>
             </a:fld>
             <a:endParaRPr lang="en-US"/>
           </a:p>
@@ -2990,7 +2990,7 @@
           <a:p>
             <a:fld id="{4FDCCE24-03B9-DF4D-B92C-1C16EC88C120}" type="datetimeFigureOut">
               <a:rPr lang="en-US" smtClean="0"/>
-              <a:t>3/7/19</a:t>
+              <a:t>5/23/19</a:t>
             </a:fld>
             <a:endParaRPr lang="en-US"/>
           </a:p>
@@ -3203,7 +3203,7 @@
           <a:p>
             <a:fld id="{4FDCCE24-03B9-DF4D-B92C-1C16EC88C120}" type="datetimeFigureOut">
               <a:rPr lang="en-US" smtClean="0"/>
-              <a:t>3/7/19</a:t>
+              <a:t>5/23/19</a:t>
             </a:fld>
             <a:endParaRPr lang="en-US"/>
           </a:p>
@@ -21529,14 +21529,82 @@
         </p:blipFill>
         <p:spPr>
           <a:xfrm>
-            <a:off x="755733" y="889857"/>
-            <a:ext cx="7526394" cy="5264419"/>
+            <a:off x="2095867" y="989152"/>
+            <a:ext cx="6730605" cy="5264419"/>
           </a:xfrm>
           <a:prstGeom prst="rect">
             <a:avLst/>
           </a:prstGeom>
         </p:spPr>
       </p:pic>
+      <p:pic>
+        <p:nvPicPr>
+          <p:cNvPr id="4" name="Picture 3"/>
+          <p:cNvPicPr>
+            <a:picLocks noChangeAspect="1"/>
+          </p:cNvPicPr>
+          <p:nvPr/>
+        </p:nvPicPr>
+        <p:blipFill>
+          <a:blip r:embed="rId4">
+            <a:extLst>
+              <a:ext uri="{28A0092B-C50C-407E-A947-70E740481C1C}">
+                <a14:useLocalDpi xmlns:a14="http://schemas.microsoft.com/office/drawing/2010/main" val="0"/>
+              </a:ext>
+            </a:extLst>
+          </a:blip>
+          <a:stretch>
+            <a:fillRect/>
+          </a:stretch>
+        </p:blipFill>
+        <p:spPr>
+          <a:xfrm>
+            <a:off x="254000" y="962140"/>
+            <a:ext cx="1625600" cy="1663700"/>
+          </a:xfrm>
+          <a:prstGeom prst="rect">
+            <a:avLst/>
+          </a:prstGeom>
+        </p:spPr>
+      </p:pic>
+      <p:sp>
+        <p:nvSpPr>
+          <p:cNvPr id="6" name="TextBox 5"/>
+          <p:cNvSpPr txBox="1"/>
+          <p:nvPr/>
+        </p:nvSpPr>
+        <p:spPr>
+          <a:xfrm>
+            <a:off x="318870" y="2741504"/>
+            <a:ext cx="1495859" cy="369332"/>
+          </a:xfrm>
+          <a:prstGeom prst="rect">
+            <a:avLst/>
+          </a:prstGeom>
+          <a:noFill/>
+        </p:spPr>
+        <p:txBody>
+          <a:bodyPr wrap="none" rtlCol="0">
+            <a:spAutoFit/>
+          </a:bodyPr>
+          <a:lstStyle/>
+          <a:p>
+            <a:r>
+              <a:rPr lang="en-US" dirty="0" err="1" smtClean="0"/>
+              <a:t>Navneet</a:t>
+            </a:r>
+            <a:r>
+              <a:rPr lang="en-US" dirty="0" smtClean="0"/>
+              <a:t> </a:t>
+            </a:r>
+            <a:r>
+              <a:rPr lang="en-US" dirty="0" err="1" smtClean="0"/>
+              <a:t>Dalal</a:t>
+            </a:r>
+            <a:endParaRPr lang="en-US" dirty="0"/>
+          </a:p>
+        </p:txBody>
+      </p:sp>
     </p:spTree>
     <p:extLst>
       <p:ext uri="{BB962C8B-B14F-4D97-AF65-F5344CB8AC3E}">

</xml_diff>